<commit_message>
Presentation added as PDF
</commit_message>
<xml_diff>
--- a/Presentation - Command Pattern.pptx
+++ b/Presentation - Command Pattern.pptx
@@ -5,13 +5,15 @@
     <p:sldMasterId id="2147483648" r:id="rId1"/>
   </p:sldMasterIdLst>
   <p:notesMasterIdLst>
-    <p:notesMasterId r:id="rId6"/>
+    <p:notesMasterId r:id="rId8"/>
   </p:notesMasterIdLst>
   <p:sldIdLst>
     <p:sldId id="256" r:id="rId2"/>
     <p:sldId id="257" r:id="rId3"/>
     <p:sldId id="258" r:id="rId4"/>
     <p:sldId id="259" r:id="rId5"/>
+    <p:sldId id="260" r:id="rId6"/>
+    <p:sldId id="261" r:id="rId7"/>
   </p:sldIdLst>
   <p:sldSz cx="12192000" cy="6858000"/>
   <p:notesSz cx="6858000" cy="9144000"/>
@@ -110,7 +112,96 @@
       </a:defRPr>
     </a:lvl9pPr>
   </p:defaultTextStyle>
+  <p:extLst>
+    <p:ext uri="{EFAFB233-063F-42B5-8137-9DF3F51BA10A}">
+      <p15:sldGuideLst xmlns:p15="http://schemas.microsoft.com/office/powerpoint/2012/main"/>
+    </p:ext>
+  </p:extLst>
 </p:presentation>
+</file>
+
+<file path=ppt/changesInfos/changesInfo1.xml><?xml version="1.0" encoding="utf-8"?>
+<pc:chgInfo xmlns:a="http://schemas.openxmlformats.org/drawingml/2006/main" xmlns:r="http://schemas.openxmlformats.org/officeDocument/2006/relationships" xmlns:ac="http://schemas.microsoft.com/office/drawing/2013/main/command" xmlns:pc="http://schemas.microsoft.com/office/powerpoint/2013/main/command">
+  <pc:docChgLst>
+    <pc:chgData name="Danny Tran" userId="6008865b-992a-48e3-87ee-93a11a609748" providerId="ADAL" clId="{39D744E5-CA2E-4559-A7BC-E1C47BF2150B}"/>
+    <pc:docChg chg="custSel addSld modSld sldOrd">
+      <pc:chgData name="Danny Tran" userId="6008865b-992a-48e3-87ee-93a11a609748" providerId="ADAL" clId="{39D744E5-CA2E-4559-A7BC-E1C47BF2150B}" dt="2018-12-02T18:11:20.386" v="314" actId="20577"/>
+      <pc:docMkLst>
+        <pc:docMk/>
+      </pc:docMkLst>
+      <pc:sldChg chg="addSp modSp add ord">
+        <pc:chgData name="Danny Tran" userId="6008865b-992a-48e3-87ee-93a11a609748" providerId="ADAL" clId="{39D744E5-CA2E-4559-A7BC-E1C47BF2150B}" dt="2018-12-02T17:57:30.593" v="52"/>
+        <pc:sldMkLst>
+          <pc:docMk/>
+          <pc:sldMk cId="2857322440" sldId="260"/>
+        </pc:sldMkLst>
+        <pc:spChg chg="mod">
+          <ac:chgData name="Danny Tran" userId="6008865b-992a-48e3-87ee-93a11a609748" providerId="ADAL" clId="{39D744E5-CA2E-4559-A7BC-E1C47BF2150B}" dt="2018-12-02T17:56:34.449" v="16" actId="20577"/>
+          <ac:spMkLst>
+            <pc:docMk/>
+            <pc:sldMk cId="2857322440" sldId="260"/>
+            <ac:spMk id="2" creationId="{DAC1C4EA-6833-4B97-880D-0954FA32C421}"/>
+          </ac:spMkLst>
+        </pc:spChg>
+        <pc:spChg chg="mod">
+          <ac:chgData name="Danny Tran" userId="6008865b-992a-48e3-87ee-93a11a609748" providerId="ADAL" clId="{39D744E5-CA2E-4559-A7BC-E1C47BF2150B}" dt="2018-12-02T17:57:13.715" v="50" actId="20577"/>
+          <ac:spMkLst>
+            <pc:docMk/>
+            <pc:sldMk cId="2857322440" sldId="260"/>
+            <ac:spMk id="3" creationId="{6D393286-7233-4ED6-A84E-ACCAA7041BD1}"/>
+          </ac:spMkLst>
+        </pc:spChg>
+        <pc:picChg chg="add">
+          <ac:chgData name="Danny Tran" userId="6008865b-992a-48e3-87ee-93a11a609748" providerId="ADAL" clId="{39D744E5-CA2E-4559-A7BC-E1C47BF2150B}" dt="2018-12-02T17:57:30.593" v="52"/>
+          <ac:picMkLst>
+            <pc:docMk/>
+            <pc:sldMk cId="2857322440" sldId="260"/>
+            <ac:picMk id="5" creationId="{DF2DA072-0671-482B-BAC3-3F991048439E}"/>
+          </ac:picMkLst>
+        </pc:picChg>
+      </pc:sldChg>
+      <pc:sldChg chg="addSp delSp modSp add">
+        <pc:chgData name="Danny Tran" userId="6008865b-992a-48e3-87ee-93a11a609748" providerId="ADAL" clId="{39D744E5-CA2E-4559-A7BC-E1C47BF2150B}" dt="2018-12-02T18:11:20.386" v="314" actId="20577"/>
+        <pc:sldMkLst>
+          <pc:docMk/>
+          <pc:sldMk cId="2184890613" sldId="261"/>
+        </pc:sldMkLst>
+        <pc:spChg chg="mod">
+          <ac:chgData name="Danny Tran" userId="6008865b-992a-48e3-87ee-93a11a609748" providerId="ADAL" clId="{39D744E5-CA2E-4559-A7BC-E1C47BF2150B}" dt="2018-12-02T18:09:02.034" v="77" actId="20577"/>
+          <ac:spMkLst>
+            <pc:docMk/>
+            <pc:sldMk cId="2184890613" sldId="261"/>
+            <ac:spMk id="2" creationId="{BE1B67FE-225F-409D-AB96-4E332217962F}"/>
+          </ac:spMkLst>
+        </pc:spChg>
+        <pc:spChg chg="mod">
+          <ac:chgData name="Danny Tran" userId="6008865b-992a-48e3-87ee-93a11a609748" providerId="ADAL" clId="{39D744E5-CA2E-4559-A7BC-E1C47BF2150B}" dt="2018-12-02T18:11:20.386" v="314" actId="20577"/>
+          <ac:spMkLst>
+            <pc:docMk/>
+            <pc:sldMk cId="2184890613" sldId="261"/>
+            <ac:spMk id="3" creationId="{7A94FC85-1833-4584-90AD-97C53D58EBF9}"/>
+          </ac:spMkLst>
+        </pc:spChg>
+        <pc:spChg chg="add del">
+          <ac:chgData name="Danny Tran" userId="6008865b-992a-48e3-87ee-93a11a609748" providerId="ADAL" clId="{39D744E5-CA2E-4559-A7BC-E1C47BF2150B}" dt="2018-12-02T18:09:35.060" v="80"/>
+          <ac:spMkLst>
+            <pc:docMk/>
+            <pc:sldMk cId="2184890613" sldId="261"/>
+            <ac:spMk id="5" creationId="{1D9DB95E-5AB5-4639-9083-BF88CF64DE0A}"/>
+          </ac:spMkLst>
+        </pc:spChg>
+        <pc:spChg chg="add del">
+          <ac:chgData name="Danny Tran" userId="6008865b-992a-48e3-87ee-93a11a609748" providerId="ADAL" clId="{39D744E5-CA2E-4559-A7BC-E1C47BF2150B}" dt="2018-12-02T18:09:37.042" v="82"/>
+          <ac:spMkLst>
+            <pc:docMk/>
+            <pc:sldMk cId="2184890613" sldId="261"/>
+            <ac:spMk id="6" creationId="{656C4585-99F0-4167-B717-3C505905D889}"/>
+          </ac:spMkLst>
+        </pc:spChg>
+      </pc:sldChg>
+    </pc:docChg>
+  </pc:docChgLst>
+</pc:chgInfo>
 </file>
 
 <file path=ppt/notesMasters/notesMaster1.xml><?xml version="1.0" encoding="utf-8"?>
@@ -4520,6 +4611,374 @@
     <p:extLst>
       <p:ext uri="{BB962C8B-B14F-4D97-AF65-F5344CB8AC3E}">
         <p14:creationId xmlns:p14="http://schemas.microsoft.com/office/powerpoint/2010/main" val="1118201674"/>
+      </p:ext>
+    </p:extLst>
+  </p:cSld>
+  <p:clrMapOvr>
+    <a:masterClrMapping/>
+  </p:clrMapOvr>
+</p:sld>
+</file>
+
+<file path=ppt/slides/slide5.xml><?xml version="1.0" encoding="utf-8"?>
+<p:sld xmlns:a="http://schemas.openxmlformats.org/drawingml/2006/main" xmlns:r="http://schemas.openxmlformats.org/officeDocument/2006/relationships" xmlns:p="http://schemas.openxmlformats.org/presentationml/2006/main">
+  <p:cSld>
+    <p:spTree>
+      <p:nvGrpSpPr>
+        <p:cNvPr id="1" name=""/>
+        <p:cNvGrpSpPr/>
+        <p:nvPr/>
+      </p:nvGrpSpPr>
+      <p:grpSpPr>
+        <a:xfrm>
+          <a:off x="0" y="0"/>
+          <a:ext cx="0" cy="0"/>
+          <a:chOff x="0" y="0"/>
+          <a:chExt cx="0" cy="0"/>
+        </a:xfrm>
+      </p:grpSpPr>
+      <p:sp>
+        <p:nvSpPr>
+          <p:cNvPr id="2" name="Titel 1">
+            <a:extLst>
+              <a:ext uri="{FF2B5EF4-FFF2-40B4-BE49-F238E27FC236}">
+                <a16:creationId xmlns:a16="http://schemas.microsoft.com/office/drawing/2014/main" id="{DAC1C4EA-6833-4B97-880D-0954FA32C421}"/>
+              </a:ext>
+            </a:extLst>
+          </p:cNvPr>
+          <p:cNvSpPr>
+            <a:spLocks noGrp="1"/>
+          </p:cNvSpPr>
+          <p:nvPr>
+            <p:ph type="title"/>
+          </p:nvPr>
+        </p:nvSpPr>
+        <p:spPr/>
+        <p:txBody>
+          <a:bodyPr/>
+          <a:lstStyle/>
+          <a:p>
+            <a:r>
+              <a:rPr lang="da-DK" dirty="0" err="1"/>
+              <a:t>Related</a:t>
+            </a:r>
+            <a:r>
+              <a:rPr lang="da-DK" dirty="0"/>
+              <a:t> Patterns</a:t>
+            </a:r>
+          </a:p>
+        </p:txBody>
+      </p:sp>
+      <p:sp>
+        <p:nvSpPr>
+          <p:cNvPr id="3" name="Pladsholder til indhold 2">
+            <a:extLst>
+              <a:ext uri="{FF2B5EF4-FFF2-40B4-BE49-F238E27FC236}">
+                <a16:creationId xmlns:a16="http://schemas.microsoft.com/office/drawing/2014/main" id="{6D393286-7233-4ED6-A84E-ACCAA7041BD1}"/>
+              </a:ext>
+            </a:extLst>
+          </p:cNvPr>
+          <p:cNvSpPr>
+            <a:spLocks noGrp="1"/>
+          </p:cNvSpPr>
+          <p:nvPr>
+            <p:ph idx="1"/>
+          </p:nvPr>
+        </p:nvSpPr>
+        <p:spPr/>
+        <p:txBody>
+          <a:bodyPr/>
+          <a:lstStyle/>
+          <a:p>
+            <a:r>
+              <a:rPr lang="da-DK" dirty="0" err="1"/>
+              <a:t>Strategy</a:t>
+            </a:r>
+            <a:r>
+              <a:rPr lang="da-DK" dirty="0"/>
+              <a:t> Pattern</a:t>
+            </a:r>
+          </a:p>
+          <a:p>
+            <a:r>
+              <a:rPr lang="da-DK" dirty="0"/>
+              <a:t>Memento Pattern</a:t>
+            </a:r>
+          </a:p>
+        </p:txBody>
+      </p:sp>
+      <p:sp>
+        <p:nvSpPr>
+          <p:cNvPr id="4" name="Pladsholder til slidenummer 3">
+            <a:extLst>
+              <a:ext uri="{FF2B5EF4-FFF2-40B4-BE49-F238E27FC236}">
+                <a16:creationId xmlns:a16="http://schemas.microsoft.com/office/drawing/2014/main" id="{785C5A8E-D7C3-4693-B579-53A576BA36CA}"/>
+              </a:ext>
+            </a:extLst>
+          </p:cNvPr>
+          <p:cNvSpPr>
+            <a:spLocks noGrp="1"/>
+          </p:cNvSpPr>
+          <p:nvPr>
+            <p:ph type="sldNum" sz="quarter" idx="12"/>
+          </p:nvPr>
+        </p:nvSpPr>
+        <p:spPr/>
+        <p:txBody>
+          <a:bodyPr/>
+          <a:lstStyle/>
+          <a:p>
+            <a:fld id="{DAE17E1E-F83B-4B76-92F3-D472F9D57258}" type="slidenum">
+              <a:rPr lang="da-DK" smtClean="0"/>
+              <a:t>5</a:t>
+            </a:fld>
+            <a:endParaRPr lang="da-DK"/>
+          </a:p>
+        </p:txBody>
+      </p:sp>
+      <p:pic>
+        <p:nvPicPr>
+          <p:cNvPr id="5" name="Billede 4">
+            <a:extLst>
+              <a:ext uri="{FF2B5EF4-FFF2-40B4-BE49-F238E27FC236}">
+                <a16:creationId xmlns:a16="http://schemas.microsoft.com/office/drawing/2014/main" id="{DF2DA072-0671-482B-BAC3-3F991048439E}"/>
+              </a:ext>
+            </a:extLst>
+          </p:cNvPr>
+          <p:cNvPicPr>
+            <a:picLocks noChangeAspect="1"/>
+          </p:cNvPicPr>
+          <p:nvPr/>
+        </p:nvPicPr>
+        <p:blipFill>
+          <a:blip r:embed="rId2"/>
+          <a:stretch>
+            <a:fillRect/>
+          </a:stretch>
+        </p:blipFill>
+        <p:spPr>
+          <a:xfrm>
+            <a:off x="9077642" y="5408502"/>
+            <a:ext cx="2276158" cy="947848"/>
+          </a:xfrm>
+          <a:prstGeom prst="rect">
+            <a:avLst/>
+          </a:prstGeom>
+        </p:spPr>
+      </p:pic>
+    </p:spTree>
+    <p:extLst>
+      <p:ext uri="{BB962C8B-B14F-4D97-AF65-F5344CB8AC3E}">
+        <p14:creationId xmlns:p14="http://schemas.microsoft.com/office/powerpoint/2010/main" val="2857322440"/>
+      </p:ext>
+    </p:extLst>
+  </p:cSld>
+  <p:clrMapOvr>
+    <a:masterClrMapping/>
+  </p:clrMapOvr>
+</p:sld>
+</file>
+
+<file path=ppt/slides/slide6.xml><?xml version="1.0" encoding="utf-8"?>
+<p:sld xmlns:a="http://schemas.openxmlformats.org/drawingml/2006/main" xmlns:r="http://schemas.openxmlformats.org/officeDocument/2006/relationships" xmlns:p="http://schemas.openxmlformats.org/presentationml/2006/main">
+  <p:cSld>
+    <p:spTree>
+      <p:nvGrpSpPr>
+        <p:cNvPr id="1" name=""/>
+        <p:cNvGrpSpPr/>
+        <p:nvPr/>
+      </p:nvGrpSpPr>
+      <p:grpSpPr>
+        <a:xfrm>
+          <a:off x="0" y="0"/>
+          <a:ext cx="0" cy="0"/>
+          <a:chOff x="0" y="0"/>
+          <a:chExt cx="0" cy="0"/>
+        </a:xfrm>
+      </p:grpSpPr>
+      <p:sp>
+        <p:nvSpPr>
+          <p:cNvPr id="2" name="Titel 1">
+            <a:extLst>
+              <a:ext uri="{FF2B5EF4-FFF2-40B4-BE49-F238E27FC236}">
+                <a16:creationId xmlns:a16="http://schemas.microsoft.com/office/drawing/2014/main" id="{BE1B67FE-225F-409D-AB96-4E332217962F}"/>
+              </a:ext>
+            </a:extLst>
+          </p:cNvPr>
+          <p:cNvSpPr>
+            <a:spLocks noGrp="1"/>
+          </p:cNvSpPr>
+          <p:nvPr>
+            <p:ph type="title"/>
+          </p:nvPr>
+        </p:nvSpPr>
+        <p:spPr/>
+        <p:txBody>
+          <a:bodyPr/>
+          <a:lstStyle/>
+          <a:p>
+            <a:r>
+              <a:rPr lang="da-DK" dirty="0"/>
+              <a:t>S.O.L.I.D </a:t>
+            </a:r>
+            <a:r>
+              <a:rPr lang="da-DK" dirty="0" err="1"/>
+              <a:t>principles</a:t>
+            </a:r>
+            <a:endParaRPr lang="da-DK" dirty="0"/>
+          </a:p>
+        </p:txBody>
+      </p:sp>
+      <p:sp>
+        <p:nvSpPr>
+          <p:cNvPr id="3" name="Pladsholder til indhold 2">
+            <a:extLst>
+              <a:ext uri="{FF2B5EF4-FFF2-40B4-BE49-F238E27FC236}">
+                <a16:creationId xmlns:a16="http://schemas.microsoft.com/office/drawing/2014/main" id="{7A94FC85-1833-4584-90AD-97C53D58EBF9}"/>
+              </a:ext>
+            </a:extLst>
+          </p:cNvPr>
+          <p:cNvSpPr>
+            <a:spLocks noGrp="1"/>
+          </p:cNvSpPr>
+          <p:nvPr>
+            <p:ph idx="1"/>
+          </p:nvPr>
+        </p:nvSpPr>
+        <p:spPr/>
+        <p:txBody>
+          <a:bodyPr/>
+          <a:lstStyle/>
+          <a:p>
+            <a:r>
+              <a:rPr lang="da-DK" dirty="0"/>
+              <a:t>S: SRP – Single </a:t>
+            </a:r>
+            <a:r>
+              <a:rPr lang="da-DK" dirty="0" err="1"/>
+              <a:t>Responsibility</a:t>
+            </a:r>
+            <a:r>
+              <a:rPr lang="da-DK" dirty="0"/>
+              <a:t> </a:t>
+            </a:r>
+            <a:r>
+              <a:rPr lang="da-DK" dirty="0" err="1"/>
+              <a:t>Principle</a:t>
+            </a:r>
+            <a:endParaRPr lang="da-DK" dirty="0"/>
+          </a:p>
+          <a:p>
+            <a:r>
+              <a:rPr lang="da-DK" dirty="0"/>
+              <a:t>O: OCP – Open-</a:t>
+            </a:r>
+            <a:r>
+              <a:rPr lang="da-DK" dirty="0" err="1"/>
+              <a:t>Closed</a:t>
+            </a:r>
+            <a:r>
+              <a:rPr lang="da-DK" dirty="0"/>
+              <a:t> </a:t>
+            </a:r>
+            <a:r>
+              <a:rPr lang="da-DK" dirty="0" err="1"/>
+              <a:t>Principle</a:t>
+            </a:r>
+            <a:endParaRPr lang="da-DK" dirty="0"/>
+          </a:p>
+          <a:p>
+            <a:r>
+              <a:rPr lang="da-DK" dirty="0"/>
+              <a:t>L: LSP – </a:t>
+            </a:r>
+            <a:r>
+              <a:rPr lang="da-DK" dirty="0" err="1"/>
+              <a:t>Liskov</a:t>
+            </a:r>
+            <a:r>
+              <a:rPr lang="da-DK" dirty="0"/>
+              <a:t> </a:t>
+            </a:r>
+            <a:r>
+              <a:rPr lang="da-DK" dirty="0" err="1"/>
+              <a:t>Subsitution</a:t>
+            </a:r>
+            <a:r>
+              <a:rPr lang="da-DK" dirty="0"/>
+              <a:t> </a:t>
+            </a:r>
+            <a:r>
+              <a:rPr lang="da-DK" dirty="0" err="1"/>
+              <a:t>Principle</a:t>
+            </a:r>
+            <a:endParaRPr lang="da-DK" dirty="0"/>
+          </a:p>
+          <a:p>
+            <a:r>
+              <a:rPr lang="da-DK" dirty="0"/>
+              <a:t>I: ISP – Interface Segregation </a:t>
+            </a:r>
+            <a:r>
+              <a:rPr lang="da-DK" dirty="0" err="1"/>
+              <a:t>Principle</a:t>
+            </a:r>
+            <a:endParaRPr lang="da-DK" dirty="0"/>
+          </a:p>
+          <a:p>
+            <a:r>
+              <a:rPr lang="da-DK" dirty="0"/>
+              <a:t>D: DIP – </a:t>
+            </a:r>
+            <a:r>
+              <a:rPr lang="da-DK" dirty="0" err="1"/>
+              <a:t>Dependency</a:t>
+            </a:r>
+            <a:r>
+              <a:rPr lang="da-DK" dirty="0"/>
+              <a:t> Inversion </a:t>
+            </a:r>
+            <a:r>
+              <a:rPr lang="da-DK" dirty="0" err="1"/>
+              <a:t>Principle</a:t>
+            </a:r>
+            <a:endParaRPr lang="da-DK" dirty="0"/>
+          </a:p>
+        </p:txBody>
+      </p:sp>
+      <p:sp>
+        <p:nvSpPr>
+          <p:cNvPr id="4" name="Pladsholder til slidenummer 3">
+            <a:extLst>
+              <a:ext uri="{FF2B5EF4-FFF2-40B4-BE49-F238E27FC236}">
+                <a16:creationId xmlns:a16="http://schemas.microsoft.com/office/drawing/2014/main" id="{DCEE6150-C882-4424-BDE0-A56062DD12A2}"/>
+              </a:ext>
+            </a:extLst>
+          </p:cNvPr>
+          <p:cNvSpPr>
+            <a:spLocks noGrp="1"/>
+          </p:cNvSpPr>
+          <p:nvPr>
+            <p:ph type="sldNum" sz="quarter" idx="12"/>
+          </p:nvPr>
+        </p:nvSpPr>
+        <p:spPr/>
+        <p:txBody>
+          <a:bodyPr/>
+          <a:lstStyle/>
+          <a:p>
+            <a:fld id="{DAE17E1E-F83B-4B76-92F3-D472F9D57258}" type="slidenum">
+              <a:rPr lang="da-DK" smtClean="0"/>
+              <a:t>6</a:t>
+            </a:fld>
+            <a:endParaRPr lang="da-DK"/>
+          </a:p>
+        </p:txBody>
+      </p:sp>
+    </p:spTree>
+    <p:extLst>
+      <p:ext uri="{BB962C8B-B14F-4D97-AF65-F5344CB8AC3E}">
+        <p14:creationId xmlns:p14="http://schemas.microsoft.com/office/powerpoint/2010/main" val="2184890613"/>
       </p:ext>
     </p:extLst>
   </p:cSld>

</xml_diff>

<commit_message>
Added AU_LOGO to Slides
</commit_message>
<xml_diff>
--- a/Presentation - Command Pattern.pptx
+++ b/Presentation - Command Pattern.pptx
@@ -125,7 +125,7 @@
   <pc:docChgLst>
     <pc:chgData name="Danny Tran" userId="6008865b-992a-48e3-87ee-93a11a609748" providerId="ADAL" clId="{39D744E5-CA2E-4559-A7BC-E1C47BF2150B}"/>
     <pc:docChg chg="custSel addSld modSld sldOrd">
-      <pc:chgData name="Danny Tran" userId="6008865b-992a-48e3-87ee-93a11a609748" providerId="ADAL" clId="{39D744E5-CA2E-4559-A7BC-E1C47BF2150B}" dt="2018-12-02T19:12:19.727" v="423" actId="20577"/>
+      <pc:chgData name="Danny Tran" userId="6008865b-992a-48e3-87ee-93a11a609748" providerId="ADAL" clId="{39D744E5-CA2E-4559-A7BC-E1C47BF2150B}" dt="2018-12-02T20:03:46.163" v="424"/>
       <pc:docMkLst>
         <pc:docMk/>
       </pc:docMkLst>
@@ -176,7 +176,7 @@
         </pc:picChg>
       </pc:sldChg>
       <pc:sldChg chg="addSp delSp modSp add">
-        <pc:chgData name="Danny Tran" userId="6008865b-992a-48e3-87ee-93a11a609748" providerId="ADAL" clId="{39D744E5-CA2E-4559-A7BC-E1C47BF2150B}" dt="2018-12-02T18:11:20.386" v="314" actId="20577"/>
+        <pc:chgData name="Danny Tran" userId="6008865b-992a-48e3-87ee-93a11a609748" providerId="ADAL" clId="{39D744E5-CA2E-4559-A7BC-E1C47BF2150B}" dt="2018-12-02T20:03:46.163" v="424"/>
         <pc:sldMkLst>
           <pc:docMk/>
           <pc:sldMk cId="2184890613" sldId="261"/>
@@ -213,6 +213,14 @@
             <ac:spMk id="6" creationId="{656C4585-99F0-4167-B717-3C505905D889}"/>
           </ac:spMkLst>
         </pc:spChg>
+        <pc:picChg chg="add">
+          <ac:chgData name="Danny Tran" userId="6008865b-992a-48e3-87ee-93a11a609748" providerId="ADAL" clId="{39D744E5-CA2E-4559-A7BC-E1C47BF2150B}" dt="2018-12-02T20:03:46.163" v="424"/>
+          <ac:picMkLst>
+            <pc:docMk/>
+            <pc:sldMk cId="2184890613" sldId="261"/>
+            <ac:picMk id="5" creationId="{B0CF425D-3D62-458D-8C46-18ADEC717AE2}"/>
+          </ac:picMkLst>
+        </pc:picChg>
       </pc:sldChg>
     </pc:docChg>
   </pc:docChgLst>
@@ -5047,6 +5055,36 @@
           </a:p>
         </p:txBody>
       </p:sp>
+      <p:pic>
+        <p:nvPicPr>
+          <p:cNvPr id="5" name="Billede 4">
+            <a:extLst>
+              <a:ext uri="{FF2B5EF4-FFF2-40B4-BE49-F238E27FC236}">
+                <a16:creationId xmlns:a16="http://schemas.microsoft.com/office/drawing/2014/main" id="{B0CF425D-3D62-458D-8C46-18ADEC717AE2}"/>
+              </a:ext>
+            </a:extLst>
+          </p:cNvPr>
+          <p:cNvPicPr>
+            <a:picLocks noChangeAspect="1"/>
+          </p:cNvPicPr>
+          <p:nvPr/>
+        </p:nvPicPr>
+        <p:blipFill>
+          <a:blip r:embed="rId2"/>
+          <a:stretch>
+            <a:fillRect/>
+          </a:stretch>
+        </p:blipFill>
+        <p:spPr>
+          <a:xfrm>
+            <a:off x="9077642" y="5408502"/>
+            <a:ext cx="2276158" cy="947848"/>
+          </a:xfrm>
+          <a:prstGeom prst="rect">
+            <a:avLst/>
+          </a:prstGeom>
+        </p:spPr>
+      </p:pic>
     </p:spTree>
     <p:extLst>
       <p:ext uri="{BB962C8B-B14F-4D97-AF65-F5344CB8AC3E}">

</xml_diff>

<commit_message>
Added a little bit more to slides
</commit_message>
<xml_diff>
--- a/Presentation - Command Pattern.pptx
+++ b/Presentation - Command Pattern.pptx
@@ -125,18 +125,18 @@
   <pc:docChgLst>
     <pc:chgData name="Danny Tran" userId="6008865b-992a-48e3-87ee-93a11a609748" providerId="ADAL" clId="{39D744E5-CA2E-4559-A7BC-E1C47BF2150B}"/>
     <pc:docChg chg="custSel addSld modSld sldOrd">
-      <pc:chgData name="Danny Tran" userId="6008865b-992a-48e3-87ee-93a11a609748" providerId="ADAL" clId="{39D744E5-CA2E-4559-A7BC-E1C47BF2150B}" dt="2018-12-02T22:45:14.715" v="432" actId="27636"/>
+      <pc:chgData name="Danny Tran" userId="6008865b-992a-48e3-87ee-93a11a609748" providerId="ADAL" clId="{39D744E5-CA2E-4559-A7BC-E1C47BF2150B}" dt="2018-12-02T23:00:24.983" v="462" actId="20577"/>
       <pc:docMkLst>
         <pc:docMk/>
       </pc:docMkLst>
       <pc:sldChg chg="modSp">
-        <pc:chgData name="Danny Tran" userId="6008865b-992a-48e3-87ee-93a11a609748" providerId="ADAL" clId="{39D744E5-CA2E-4559-A7BC-E1C47BF2150B}" dt="2018-12-02T22:45:14.715" v="432" actId="27636"/>
+        <pc:chgData name="Danny Tran" userId="6008865b-992a-48e3-87ee-93a11a609748" providerId="ADAL" clId="{39D744E5-CA2E-4559-A7BC-E1C47BF2150B}" dt="2018-12-02T23:00:24.983" v="462" actId="20577"/>
         <pc:sldMkLst>
           <pc:docMk/>
           <pc:sldMk cId="3776282537" sldId="257"/>
         </pc:sldMkLst>
         <pc:spChg chg="mod">
-          <ac:chgData name="Danny Tran" userId="6008865b-992a-48e3-87ee-93a11a609748" providerId="ADAL" clId="{39D744E5-CA2E-4559-A7BC-E1C47BF2150B}" dt="2018-12-02T22:45:14.715" v="432" actId="27636"/>
+          <ac:chgData name="Danny Tran" userId="6008865b-992a-48e3-87ee-93a11a609748" providerId="ADAL" clId="{39D744E5-CA2E-4559-A7BC-E1C47BF2150B}" dt="2018-12-02T23:00:24.983" v="462" actId="20577"/>
           <ac:spMkLst>
             <pc:docMk/>
             <pc:sldMk cId="3776282537" sldId="257"/>
@@ -191,7 +191,7 @@
         </pc:picChg>
       </pc:sldChg>
       <pc:sldChg chg="addSp delSp modSp add">
-        <pc:chgData name="Danny Tran" userId="6008865b-992a-48e3-87ee-93a11a609748" providerId="ADAL" clId="{39D744E5-CA2E-4559-A7BC-E1C47BF2150B}" dt="2018-12-02T20:03:46.163" v="424"/>
+        <pc:chgData name="Danny Tran" userId="6008865b-992a-48e3-87ee-93a11a609748" providerId="ADAL" clId="{39D744E5-CA2E-4559-A7BC-E1C47BF2150B}" dt="2018-12-02T20:03:46.163" v="424" actId="27636"/>
         <pc:sldMkLst>
           <pc:docMk/>
           <pc:sldMk cId="2184890613" sldId="261"/>
@@ -229,7 +229,7 @@
           </ac:spMkLst>
         </pc:spChg>
         <pc:picChg chg="add">
-          <ac:chgData name="Danny Tran" userId="6008865b-992a-48e3-87ee-93a11a609748" providerId="ADAL" clId="{39D744E5-CA2E-4559-A7BC-E1C47BF2150B}" dt="2018-12-02T20:03:46.163" v="424"/>
+          <ac:chgData name="Danny Tran" userId="6008865b-992a-48e3-87ee-93a11a609748" providerId="ADAL" clId="{39D744E5-CA2E-4559-A7BC-E1C47BF2150B}" dt="2018-12-02T20:03:46.163" v="424" actId="27636"/>
           <ac:picMkLst>
             <pc:docMk/>
             <pc:sldMk cId="2184890613" sldId="261"/>
@@ -324,7 +324,7 @@
           <a:p>
             <a:fld id="{7E0CA676-34B3-415A-AD38-9ACA4679FF42}" type="datetimeFigureOut">
               <a:rPr lang="da-DK" smtClean="0"/>
-              <a:t>02-12-2018</a:t>
+              <a:t>03-12-2018</a:t>
             </a:fld>
             <a:endParaRPr lang="da-DK"/>
           </a:p>
@@ -738,7 +738,7 @@
           <a:p>
             <a:fld id="{E8D43B68-283D-4BF6-8446-9711A930A693}" type="datetime1">
               <a:rPr lang="da-DK" smtClean="0"/>
-              <a:t>02-12-2018</a:t>
+              <a:t>03-12-2018</a:t>
             </a:fld>
             <a:endParaRPr lang="da-DK"/>
           </a:p>
@@ -936,7 +936,7 @@
           <a:p>
             <a:fld id="{CEFB9D68-FE67-44B5-B9CE-DAABECF858BF}" type="datetime1">
               <a:rPr lang="da-DK" smtClean="0"/>
-              <a:t>02-12-2018</a:t>
+              <a:t>03-12-2018</a:t>
             </a:fld>
             <a:endParaRPr lang="da-DK"/>
           </a:p>
@@ -1144,7 +1144,7 @@
           <a:p>
             <a:fld id="{C51E9358-F98F-48D0-B26F-62C3A4DCC79D}" type="datetime1">
               <a:rPr lang="da-DK" smtClean="0"/>
-              <a:t>02-12-2018</a:t>
+              <a:t>03-12-2018</a:t>
             </a:fld>
             <a:endParaRPr lang="da-DK"/>
           </a:p>
@@ -1342,7 +1342,7 @@
           <a:p>
             <a:fld id="{BED65EA3-B5F2-4C77-A3B4-07161017B5AC}" type="datetime1">
               <a:rPr lang="da-DK" smtClean="0"/>
-              <a:t>02-12-2018</a:t>
+              <a:t>03-12-2018</a:t>
             </a:fld>
             <a:endParaRPr lang="da-DK"/>
           </a:p>
@@ -1617,7 +1617,7 @@
           <a:p>
             <a:fld id="{090720A2-2857-435C-9526-C6CD4F131B4F}" type="datetime1">
               <a:rPr lang="da-DK" smtClean="0"/>
-              <a:t>02-12-2018</a:t>
+              <a:t>03-12-2018</a:t>
             </a:fld>
             <a:endParaRPr lang="da-DK"/>
           </a:p>
@@ -1882,7 +1882,7 @@
           <a:p>
             <a:fld id="{7C589A16-E752-4793-AB98-0DF309E0ED1A}" type="datetime1">
               <a:rPr lang="da-DK" smtClean="0"/>
-              <a:t>02-12-2018</a:t>
+              <a:t>03-12-2018</a:t>
             </a:fld>
             <a:endParaRPr lang="da-DK"/>
           </a:p>
@@ -2294,7 +2294,7 @@
           <a:p>
             <a:fld id="{998F79E3-EA5E-4D81-B966-64F63280AD56}" type="datetime1">
               <a:rPr lang="da-DK" smtClean="0"/>
-              <a:t>02-12-2018</a:t>
+              <a:t>03-12-2018</a:t>
             </a:fld>
             <a:endParaRPr lang="da-DK"/>
           </a:p>
@@ -2435,7 +2435,7 @@
           <a:p>
             <a:fld id="{E8BC0B99-A493-431E-A7AF-CB99C4E530B7}" type="datetime1">
               <a:rPr lang="da-DK" smtClean="0"/>
-              <a:t>02-12-2018</a:t>
+              <a:t>03-12-2018</a:t>
             </a:fld>
             <a:endParaRPr lang="da-DK"/>
           </a:p>
@@ -2548,7 +2548,7 @@
           <a:p>
             <a:fld id="{CACA0106-BE43-4DFB-803C-19164B5BC145}" type="datetime1">
               <a:rPr lang="da-DK" smtClean="0"/>
-              <a:t>02-12-2018</a:t>
+              <a:t>03-12-2018</a:t>
             </a:fld>
             <a:endParaRPr lang="da-DK"/>
           </a:p>
@@ -2859,7 +2859,7 @@
           <a:p>
             <a:fld id="{BAA39D5F-F71C-4989-A2E4-17D9FF745229}" type="datetime1">
               <a:rPr lang="da-DK" smtClean="0"/>
-              <a:t>02-12-2018</a:t>
+              <a:t>03-12-2018</a:t>
             </a:fld>
             <a:endParaRPr lang="da-DK"/>
           </a:p>
@@ -3147,7 +3147,7 @@
           <a:p>
             <a:fld id="{49AE01A2-25F7-4BD7-A28E-D1F46176BA73}" type="datetime1">
               <a:rPr lang="da-DK" smtClean="0"/>
-              <a:t>02-12-2018</a:t>
+              <a:t>03-12-2018</a:t>
             </a:fld>
             <a:endParaRPr lang="da-DK"/>
           </a:p>
@@ -3388,7 +3388,7 @@
           <a:p>
             <a:fld id="{9C0BEB79-B651-4771-A5E3-7BF79A4ED293}" type="datetime1">
               <a:rPr lang="da-DK" smtClean="0"/>
-              <a:t>02-12-2018</a:t>
+              <a:t>03-12-2018</a:t>
             </a:fld>
             <a:endParaRPr lang="da-DK"/>
           </a:p>
@@ -3998,7 +3998,7 @@
         <p:spPr/>
         <p:txBody>
           <a:bodyPr>
-            <a:normAutofit fontScale="85000" lnSpcReduction="20000"/>
+            <a:normAutofit fontScale="77500" lnSpcReduction="20000"/>
           </a:bodyPr>
           <a:lstStyle/>
           <a:p>
@@ -4168,6 +4168,21 @@
             <a:r>
               <a:rPr lang="da-DK" dirty="0" err="1"/>
               <a:t>queue</a:t>
+            </a:r>
+            <a:endParaRPr lang="da-DK" dirty="0"/>
+          </a:p>
+          <a:p>
+            <a:r>
+              <a:rPr lang="da-DK" dirty="0"/>
+              <a:t>Supports </a:t>
+            </a:r>
+            <a:r>
+              <a:rPr lang="da-DK" dirty="0" err="1"/>
+              <a:t>undoable</a:t>
+            </a:r>
+            <a:r>
+              <a:rPr lang="da-DK"/>
+              <a:t> operations</a:t>
             </a:r>
             <a:endParaRPr lang="da-DK" dirty="0"/>
           </a:p>

</xml_diff>